<commit_message>
add instructions to hw3
</commit_message>
<xml_diff>
--- a/lessons/C_Sentiment_Unsupervised/Day3_vid3.pptx
+++ b/lessons/C_Sentiment_Unsupervised/Day3_vid3.pptx
@@ -233,7 +233,7 @@
           <a:p>
             <a:fld id="{B0C0A60C-850A-4EA4-9C14-A8FE98B94505}" type="datetimeFigureOut">
               <a:rPr lang="en-US" smtClean="0"/>
-              <a:t>6/2/20</a:t>
+              <a:t>6/9/20</a:t>
             </a:fld>
             <a:endParaRPr lang="en-US"/>
           </a:p>
@@ -632,7 +632,7 @@
           <a:p>
             <a:fld id="{5738B90E-0779-4C36-915C-6F05FCD89456}" type="datetime1">
               <a:rPr lang="en-US" smtClean="0"/>
-              <a:t>6/2/20</a:t>
+              <a:t>6/9/20</a:t>
             </a:fld>
             <a:endParaRPr lang="en-US"/>
           </a:p>
@@ -829,7 +829,7 @@
           <a:p>
             <a:fld id="{7B9EA29D-D431-42FE-B7B6-AAE4454C77D3}" type="datetime1">
               <a:rPr lang="en-US" smtClean="0"/>
-              <a:t>6/2/20</a:t>
+              <a:t>6/9/20</a:t>
             </a:fld>
             <a:endParaRPr lang="en-US"/>
           </a:p>
@@ -1184,7 +1184,7 @@
           <a:p>
             <a:fld id="{690D8A1E-EA8F-46C1-B891-AE0C00D9C314}" type="datetime1">
               <a:rPr lang="en-US" smtClean="0"/>
-              <a:t>6/2/20</a:t>
+              <a:t>6/9/20</a:t>
             </a:fld>
             <a:endParaRPr lang="en-US"/>
           </a:p>
@@ -1492,7 +1492,7 @@
           <a:p>
             <a:fld id="{D753EFC8-4232-4598-94F6-94C0EBAFC469}" type="datetime1">
               <a:rPr lang="en-US" smtClean="0"/>
-              <a:t>6/2/20</a:t>
+              <a:t>6/9/20</a:t>
             </a:fld>
             <a:endParaRPr lang="en-US"/>
           </a:p>
@@ -1821,7 +1821,7 @@
           <a:p>
             <a:fld id="{F3161074-1C18-4AE7-957D-F18524378C85}" type="datetime1">
               <a:rPr lang="en-US" smtClean="0"/>
-              <a:t>6/2/20</a:t>
+              <a:t>6/9/20</a:t>
             </a:fld>
             <a:endParaRPr lang="en-US"/>
           </a:p>
@@ -2074,7 +2074,7 @@
           <a:p>
             <a:fld id="{69BE256C-8D9A-4404-B47D-41A1AE514425}" type="datetime1">
               <a:rPr lang="en-US" smtClean="0"/>
-              <a:t>6/2/20</a:t>
+              <a:t>6/9/20</a:t>
             </a:fld>
             <a:endParaRPr lang="en-US"/>
           </a:p>
@@ -2522,7 +2522,7 @@
           <a:p>
             <a:fld id="{66CB2154-9035-4012-8189-BAAB61C5A5EE}" type="datetime1">
               <a:rPr lang="en-US" smtClean="0"/>
-              <a:t>6/2/20</a:t>
+              <a:t>6/9/20</a:t>
             </a:fld>
             <a:endParaRPr lang="en-US"/>
           </a:p>
@@ -2710,7 +2710,7 @@
           <a:p>
             <a:fld id="{6700A58B-DD98-43D0-B791-721480A02982}" type="datetime1">
               <a:rPr lang="en-US" smtClean="0"/>
-              <a:t>6/2/20</a:t>
+              <a:t>6/9/20</a:t>
             </a:fld>
             <a:endParaRPr lang="en-US"/>
           </a:p>
@@ -2916,7 +2916,7 @@
           <a:p>
             <a:fld id="{7DB6E382-4F61-4E24-BE1A-377EC83D0E3A}" type="datetime1">
               <a:rPr lang="en-US" smtClean="0"/>
-              <a:t>6/2/20</a:t>
+              <a:t>6/9/20</a:t>
             </a:fld>
             <a:endParaRPr lang="en-US"/>
           </a:p>
@@ -3322,7 +3322,7 @@
           <a:p>
             <a:fld id="{4142EED6-FC16-45B9-B8C4-2BC5DBA88325}" type="datetime1">
               <a:rPr lang="en-US" smtClean="0"/>
-              <a:t>6/2/20</a:t>
+              <a:t>6/9/20</a:t>
             </a:fld>
             <a:endParaRPr lang="en-US"/>
           </a:p>
@@ -3654,7 +3654,7 @@
           <a:p>
             <a:fld id="{DF59512B-4F1D-43D7-8819-2F53FEF69650}" type="datetime1">
               <a:rPr lang="en-US" smtClean="0"/>
-              <a:t>6/2/20</a:t>
+              <a:t>6/9/20</a:t>
             </a:fld>
             <a:endParaRPr lang="en-US"/>
           </a:p>
@@ -3944,7 +3944,7 @@
           <a:p>
             <a:fld id="{08437B94-E2BF-44DC-ADC5-B05FC9934E9D}" type="datetime1">
               <a:rPr lang="en-US" smtClean="0"/>
-              <a:t>6/2/20</a:t>
+              <a:t>6/9/20</a:t>
             </a:fld>
             <a:endParaRPr lang="en-US"/>
           </a:p>
@@ -4416,14 +4416,14 @@
           <a:p>
             <a:r>
               <a:rPr lang="en-US" dirty="0"/>
-              <a:t>GSERM: Text Mining &amp; NLP</a:t>
+              <a:t>GSERM: Text &amp; </a:t>
             </a:r>
             <a:br>
               <a:rPr lang="en-US" dirty="0"/>
             </a:br>
             <a:r>
               <a:rPr lang="en-US" dirty="0"/>
-              <a:t>Sentiment Analysis</a:t>
+              <a:t>Un-Supervised Learning</a:t>
             </a:r>
           </a:p>
         </p:txBody>
@@ -4468,7 +4468,7 @@
             <a:fld id="{5738B90E-0779-4C36-915C-6F05FCD89456}" type="datetime1">
               <a:rPr lang="en-US" smtClean="0"/>
               <a:pPr/>
-              <a:t>6/2/20</a:t>
+              <a:t>6/9/20</a:t>
             </a:fld>
             <a:endParaRPr lang="en-US"/>
           </a:p>
@@ -4660,7 +4660,7 @@
           <a:p>
             <a:fld id="{6700A58B-DD98-43D0-B791-721480A02982}" type="datetime1">
               <a:rPr lang="en-US" smtClean="0"/>
-              <a:t>6/2/20</a:t>
+              <a:t>6/9/20</a:t>
             </a:fld>
             <a:endParaRPr lang="en-US"/>
           </a:p>
@@ -4973,7 +4973,7 @@
           <a:p>
             <a:fld id="{6700A58B-DD98-43D0-B791-721480A02982}" type="datetime1">
               <a:rPr lang="en-US" smtClean="0"/>
-              <a:t>6/2/20</a:t>
+              <a:t>6/9/20</a:t>
             </a:fld>
             <a:endParaRPr lang="en-US"/>
           </a:p>
@@ -5385,7 +5385,7 @@
           <a:p>
             <a:fld id="{6700A58B-DD98-43D0-B791-721480A02982}" type="datetime1">
               <a:rPr lang="en-US" smtClean="0"/>
-              <a:t>6/2/20</a:t>
+              <a:t>6/9/20</a:t>
             </a:fld>
             <a:endParaRPr lang="en-US"/>
           </a:p>
@@ -5925,7 +5925,7 @@
           <a:p>
             <a:fld id="{6700A58B-DD98-43D0-B791-721480A02982}" type="datetime1">
               <a:rPr lang="en-US" smtClean="0"/>
-              <a:t>6/2/20</a:t>
+              <a:t>6/9/20</a:t>
             </a:fld>
             <a:endParaRPr lang="en-US"/>
           </a:p>
@@ -6384,7 +6384,7 @@
           <a:p>
             <a:fld id="{6700A58B-DD98-43D0-B791-721480A02982}" type="datetime1">
               <a:rPr lang="en-US" smtClean="0"/>
-              <a:t>6/2/20</a:t>
+              <a:t>6/9/20</a:t>
             </a:fld>
             <a:endParaRPr lang="en-US"/>
           </a:p>
@@ -6695,7 +6695,7 @@
           <a:p>
             <a:fld id="{6700A58B-DD98-43D0-B791-721480A02982}" type="datetime1">
               <a:rPr lang="en-US" smtClean="0"/>
-              <a:t>6/2/20</a:t>
+              <a:t>6/9/20</a:t>
             </a:fld>
             <a:endParaRPr lang="en-US"/>
           </a:p>
@@ -7013,7 +7013,7 @@
           <a:p>
             <a:fld id="{6700A58B-DD98-43D0-B791-721480A02982}" type="datetime1">
               <a:rPr lang="en-US" smtClean="0"/>
-              <a:t>6/2/20</a:t>
+              <a:t>6/9/20</a:t>
             </a:fld>
             <a:endParaRPr lang="en-US"/>
           </a:p>
@@ -7330,7 +7330,7 @@
           <a:p>
             <a:fld id="{6700A58B-DD98-43D0-B791-721480A02982}" type="datetime1">
               <a:rPr lang="en-US" smtClean="0"/>
-              <a:t>6/2/20</a:t>
+              <a:t>6/9/20</a:t>
             </a:fld>
             <a:endParaRPr lang="en-US"/>
           </a:p>
@@ -7614,7 +7614,7 @@
           <a:p>
             <a:fld id="{6700A58B-DD98-43D0-B791-721480A02982}" type="datetime1">
               <a:rPr lang="en-US" smtClean="0"/>
-              <a:t>6/2/20</a:t>
+              <a:t>6/9/20</a:t>
             </a:fld>
             <a:endParaRPr lang="en-US"/>
           </a:p>
@@ -8100,7 +8100,7 @@
           <a:p>
             <a:fld id="{6700A58B-DD98-43D0-B791-721480A02982}" type="datetime1">
               <a:rPr lang="en-US" smtClean="0"/>
-              <a:t>6/2/20</a:t>
+              <a:t>6/9/20</a:t>
             </a:fld>
             <a:endParaRPr lang="en-US"/>
           </a:p>
@@ -8366,7 +8366,7 @@
           <a:p>
             <a:fld id="{6700A58B-DD98-43D0-B791-721480A02982}" type="datetime1">
               <a:rPr lang="en-US" smtClean="0"/>
-              <a:t>6/2/20</a:t>
+              <a:t>6/9/20</a:t>
             </a:fld>
             <a:endParaRPr lang="en-US"/>
           </a:p>
@@ -8850,7 +8850,7 @@
           <a:p>
             <a:fld id="{6700A58B-DD98-43D0-B791-721480A02982}" type="datetime1">
               <a:rPr lang="en-US" smtClean="0"/>
-              <a:t>6/2/20</a:t>
+              <a:t>6/9/20</a:t>
             </a:fld>
             <a:endParaRPr lang="en-US"/>
           </a:p>
@@ -9225,7 +9225,7 @@
           <a:p>
             <a:fld id="{6700A58B-DD98-43D0-B791-721480A02982}" type="datetime1">
               <a:rPr lang="en-US" smtClean="0"/>
-              <a:t>6/2/20</a:t>
+              <a:t>6/9/20</a:t>
             </a:fld>
             <a:endParaRPr lang="en-US"/>
           </a:p>
@@ -11135,7 +11135,7 @@
           <a:p>
             <a:fld id="{6700A58B-DD98-43D0-B791-721480A02982}" type="datetime1">
               <a:rPr lang="en-US" smtClean="0"/>
-              <a:t>6/2/20</a:t>
+              <a:t>6/9/20</a:t>
             </a:fld>
             <a:endParaRPr lang="en-US"/>
           </a:p>
@@ -11440,7 +11440,7 @@
           <a:p>
             <a:fld id="{6700A58B-DD98-43D0-B791-721480A02982}" type="datetime1">
               <a:rPr lang="en-US" smtClean="0"/>
-              <a:t>6/2/20</a:t>
+              <a:t>6/9/20</a:t>
             </a:fld>
             <a:endParaRPr lang="en-US"/>
           </a:p>
@@ -11897,7 +11897,7 @@
           <a:p>
             <a:fld id="{6700A58B-DD98-43D0-B791-721480A02982}" type="datetime1">
               <a:rPr lang="en-US" smtClean="0"/>
-              <a:t>6/2/20</a:t>
+              <a:t>6/9/20</a:t>
             </a:fld>
             <a:endParaRPr lang="en-US"/>
           </a:p>
@@ -14176,7 +14176,7 @@
           <a:p>
             <a:fld id="{6700A58B-DD98-43D0-B791-721480A02982}" type="datetime1">
               <a:rPr lang="en-US" smtClean="0"/>
-              <a:t>6/2/20</a:t>
+              <a:t>6/9/20</a:t>
             </a:fld>
             <a:endParaRPr lang="en-US"/>
           </a:p>
@@ -14654,7 +14654,7 @@
           <a:p>
             <a:fld id="{6700A58B-DD98-43D0-B791-721480A02982}" type="datetime1">
               <a:rPr lang="en-US" smtClean="0"/>
-              <a:t>6/2/20</a:t>
+              <a:t>6/9/20</a:t>
             </a:fld>
             <a:endParaRPr lang="en-US"/>
           </a:p>
@@ -15132,7 +15132,7 @@
           <a:p>
             <a:fld id="{6700A58B-DD98-43D0-B791-721480A02982}" type="datetime1">
               <a:rPr lang="en-US" smtClean="0"/>
-              <a:t>6/2/20</a:t>
+              <a:t>6/9/20</a:t>
             </a:fld>
             <a:endParaRPr lang="en-US"/>
           </a:p>

</xml_diff>